<commit_message>
Whole Lot more reporting
git-svn-id: svn://localhost/ARK/trunk@7987 35ee9b83-dd2c-47f4-99a2-c706670c48ce
</commit_message>
<xml_diff>
--- a/usefulTools/TestFilesAndDocuments/steering committee/NeCTAR/Steering Committee Meetings/Steering Committee Meeting March_2013.pptx
+++ b/usefulTools/TestFilesAndDocuments/steering committee/NeCTAR/Steering Committee Meetings/Steering Committee Meeting March_2013.pptx
@@ -4250,7 +4250,7 @@
         <p:spPr/>
         <p:txBody>
           <a:bodyPr>
-            <a:normAutofit fontScale="92500"/>
+            <a:normAutofit fontScale="92500" lnSpcReduction="10000"/>
           </a:bodyPr>
           <a:lstStyle/>
           <a:p>
@@ -5023,7 +5023,7 @@
                     <a:p>
                       <a:r>
                         <a:rPr lang="en-AU" sz="1600" dirty="0" smtClean="0"/>
-                        <a:t>?</a:t>
+                        <a:t>Travis will take these?</a:t>
                       </a:r>
                       <a:endParaRPr lang="en-AU" sz="1600" dirty="0"/>
                     </a:p>
@@ -5084,6 +5084,14 @@
                     <a:p>
                       <a:r>
                         <a:rPr lang="en-AU" sz="1600" dirty="0" smtClean="0"/>
+                        <a:t>Travis</a:t>
+                      </a:r>
+                      <a:r>
+                        <a:rPr lang="en-AU" sz="1600" baseline="0" dirty="0" smtClean="0"/>
+                        <a:t> will take these</a:t>
+                      </a:r>
+                      <a:r>
+                        <a:rPr lang="en-AU" sz="1600" dirty="0" smtClean="0"/>
                         <a:t>?</a:t>
                       </a:r>
                       <a:endParaRPr lang="en-AU" sz="1600" dirty="0"/>
@@ -5593,7 +5601,15 @@
             </a:r>
             <a:r>
               <a:rPr lang="en-AU" sz="2800" dirty="0" smtClean="0"/>
-              <a:t> contribution: $289,00 (note revised down from initial request)</a:t>
+              <a:t> contribution: $</a:t>
+            </a:r>
+            <a:r>
+              <a:rPr lang="en-AU" sz="2800" dirty="0" smtClean="0"/>
+              <a:t>289,000 </a:t>
+            </a:r>
+            <a:r>
+              <a:rPr lang="en-AU" sz="2800" dirty="0" smtClean="0"/>
+              <a:t>(note revised down from initial request)</a:t>
             </a:r>
           </a:p>
           <a:p>
@@ -5947,8 +5963,24 @@
             <a:pPr lvl="0"/>
             <a:r>
               <a:rPr lang="en-AU" dirty="0" smtClean="0"/>
-              <a:t>Date for next meeting – propose mid June, 2013.</a:t>
-            </a:r>
+              <a:t>Date for next meeting – propose mid June, 2013</a:t>
+            </a:r>
+            <a:r>
+              <a:rPr lang="en-AU" dirty="0" smtClean="0"/>
+              <a:t>.</a:t>
+            </a:r>
+          </a:p>
+          <a:p>
+            <a:pPr lvl="0"/>
+            <a:r>
+              <a:rPr lang="en-AU" dirty="0" err="1" smtClean="0"/>
+              <a:t>Updaqte</a:t>
+            </a:r>
+            <a:r>
+              <a:rPr lang="en-AU" dirty="0" smtClean="0"/>
+              <a:t> via email next report milestone</a:t>
+            </a:r>
+            <a:endParaRPr lang="en-AU" dirty="0" smtClean="0"/>
           </a:p>
           <a:p>
             <a:r>

</xml_diff>